<commit_message>
added the latest code changes and updated report.
</commit_message>
<xml_diff>
--- a/assignments/assignment1-Feb10/Coffee_Effect_Journal.pptx
+++ b/assignments/assignment1-Feb10/Coffee_Effect_Journal.pptx
@@ -14,7 +14,7 @@
     <p:sldId id="256" r:id="rId3"/>
   </p:sldIdLst>
   <p:sldSz cx="43891200" cy="32918400"/>
-  <p:notesSz cx="6858000" cy="9144000"/>
+  <p:notesSz cx="7099300" cy="10234613"/>
   <p:defaultTextStyle>
     <a:defPPr>
       <a:defRPr lang="en-US"/>
@@ -156,17 +156,17 @@
         <p:spPr>
           <a:xfrm>
             <a:off x="0" y="0"/>
-            <a:ext cx="2971800" cy="458788"/>
+            <a:ext cx="3076363" cy="513508"/>
           </a:xfrm>
           <a:prstGeom prst="rect">
             <a:avLst/>
           </a:prstGeom>
         </p:spPr>
         <p:txBody>
-          <a:bodyPr vert="horz" lIns="91440" tIns="45720" rIns="91440" bIns="45720" rtlCol="0"/>
+          <a:bodyPr vert="horz" lIns="99048" tIns="49524" rIns="99048" bIns="49524" rtlCol="0"/>
           <a:lstStyle>
             <a:lvl1pPr algn="l">
-              <a:defRPr sz="1200"/>
+              <a:defRPr sz="1300"/>
             </a:lvl1pPr>
           </a:lstStyle>
           <a:p>
@@ -186,24 +186,24 @@
         </p:nvSpPr>
         <p:spPr>
           <a:xfrm>
-            <a:off x="3884613" y="0"/>
-            <a:ext cx="2971800" cy="458788"/>
+            <a:off x="4021294" y="0"/>
+            <a:ext cx="3076363" cy="513508"/>
           </a:xfrm>
           <a:prstGeom prst="rect">
             <a:avLst/>
           </a:prstGeom>
         </p:spPr>
         <p:txBody>
-          <a:bodyPr vert="horz" lIns="91440" tIns="45720" rIns="91440" bIns="45720" rtlCol="0"/>
+          <a:bodyPr vert="horz" lIns="99048" tIns="49524" rIns="99048" bIns="49524" rtlCol="0"/>
           <a:lstStyle>
             <a:lvl1pPr algn="r">
-              <a:defRPr sz="1200"/>
+              <a:defRPr sz="1300"/>
             </a:lvl1pPr>
           </a:lstStyle>
           <a:p>
             <a:fld id="{F1C0B079-A316-4C9B-B165-DF9EA8325D2C}" type="datetimeFigureOut">
               <a:rPr lang="en-US" smtClean="0"/>
-              <a:t>2/5/2017</a:t>
+              <a:t>2/6/2017</a:t>
             </a:fld>
             <a:endParaRPr lang="en-US"/>
           </a:p>
@@ -221,18 +221,18 @@
         </p:nvSpPr>
         <p:spPr>
           <a:xfrm>
-            <a:off x="0" y="8685213"/>
-            <a:ext cx="2971800" cy="458787"/>
+            <a:off x="0" y="9721107"/>
+            <a:ext cx="3076363" cy="513507"/>
           </a:xfrm>
           <a:prstGeom prst="rect">
             <a:avLst/>
           </a:prstGeom>
         </p:spPr>
         <p:txBody>
-          <a:bodyPr vert="horz" lIns="91440" tIns="45720" rIns="91440" bIns="45720" rtlCol="0" anchor="b"/>
+          <a:bodyPr vert="horz" lIns="99048" tIns="49524" rIns="99048" bIns="49524" rtlCol="0" anchor="b"/>
           <a:lstStyle>
             <a:lvl1pPr algn="l">
-              <a:defRPr sz="1200"/>
+              <a:defRPr sz="1300"/>
             </a:lvl1pPr>
           </a:lstStyle>
           <a:p>
@@ -252,18 +252,18 @@
         </p:nvSpPr>
         <p:spPr>
           <a:xfrm>
-            <a:off x="3884613" y="8685213"/>
-            <a:ext cx="2971800" cy="458787"/>
+            <a:off x="4021294" y="9721107"/>
+            <a:ext cx="3076363" cy="513507"/>
           </a:xfrm>
           <a:prstGeom prst="rect">
             <a:avLst/>
           </a:prstGeom>
         </p:spPr>
         <p:txBody>
-          <a:bodyPr vert="horz" lIns="91440" tIns="45720" rIns="91440" bIns="45720" rtlCol="0" anchor="b"/>
+          <a:bodyPr vert="horz" lIns="99048" tIns="49524" rIns="99048" bIns="49524" rtlCol="0" anchor="b"/>
           <a:lstStyle>
             <a:lvl1pPr algn="r">
-              <a:defRPr sz="1200"/>
+              <a:defRPr sz="1300"/>
             </a:lvl1pPr>
           </a:lstStyle>
           <a:p>
@@ -321,17 +321,17 @@
         <p:spPr>
           <a:xfrm>
             <a:off x="0" y="0"/>
-            <a:ext cx="2971800" cy="458788"/>
+            <a:ext cx="3076363" cy="513508"/>
           </a:xfrm>
           <a:prstGeom prst="rect">
             <a:avLst/>
           </a:prstGeom>
         </p:spPr>
         <p:txBody>
-          <a:bodyPr vert="horz" lIns="91440" tIns="45720" rIns="91440" bIns="45720" rtlCol="0"/>
+          <a:bodyPr vert="horz" lIns="99048" tIns="49524" rIns="99048" bIns="49524" rtlCol="0"/>
           <a:lstStyle>
             <a:lvl1pPr algn="l">
-              <a:defRPr sz="1200"/>
+              <a:defRPr sz="1300"/>
             </a:lvl1pPr>
           </a:lstStyle>
           <a:p>
@@ -351,24 +351,24 @@
         </p:nvSpPr>
         <p:spPr>
           <a:xfrm>
-            <a:off x="3884613" y="0"/>
-            <a:ext cx="2971800" cy="458788"/>
+            <a:off x="4021294" y="0"/>
+            <a:ext cx="3076363" cy="513508"/>
           </a:xfrm>
           <a:prstGeom prst="rect">
             <a:avLst/>
           </a:prstGeom>
         </p:spPr>
         <p:txBody>
-          <a:bodyPr vert="horz" lIns="91440" tIns="45720" rIns="91440" bIns="45720" rtlCol="0"/>
+          <a:bodyPr vert="horz" lIns="99048" tIns="49524" rIns="99048" bIns="49524" rtlCol="0"/>
           <a:lstStyle>
             <a:lvl1pPr algn="r">
-              <a:defRPr sz="1200"/>
+              <a:defRPr sz="1300"/>
             </a:lvl1pPr>
           </a:lstStyle>
           <a:p>
             <a:fld id="{38F28AB8-57D1-494F-9851-055AD867E790}" type="datetimeFigureOut">
               <a:rPr lang="en-US" smtClean="0"/>
-              <a:t>2/5/2017</a:t>
+              <a:t>2/6/2017</a:t>
             </a:fld>
             <a:endParaRPr lang="en-US"/>
           </a:p>
@@ -386,8 +386,8 @@
         </p:nvSpPr>
         <p:spPr>
           <a:xfrm>
-            <a:off x="1371600" y="1143000"/>
-            <a:ext cx="4114800" cy="3086100"/>
+            <a:off x="1247775" y="1279525"/>
+            <a:ext cx="4603750" cy="3454400"/>
           </a:xfrm>
           <a:prstGeom prst="rect">
             <a:avLst/>
@@ -400,7 +400,7 @@
           </a:ln>
         </p:spPr>
         <p:txBody>
-          <a:bodyPr vert="horz" lIns="91440" tIns="45720" rIns="91440" bIns="45720" rtlCol="0" anchor="ctr"/>
+          <a:bodyPr vert="horz" lIns="99048" tIns="49524" rIns="99048" bIns="49524" rtlCol="0" anchor="ctr"/>
           <a:lstStyle/>
           <a:p>
             <a:endParaRPr lang="en-US"/>
@@ -419,15 +419,15 @@
         </p:nvSpPr>
         <p:spPr>
           <a:xfrm>
-            <a:off x="685800" y="4400550"/>
-            <a:ext cx="5486400" cy="3600450"/>
+            <a:off x="709930" y="4925407"/>
+            <a:ext cx="5679440" cy="4029879"/>
           </a:xfrm>
           <a:prstGeom prst="rect">
             <a:avLst/>
           </a:prstGeom>
         </p:spPr>
         <p:txBody>
-          <a:bodyPr vert="horz" lIns="91440" tIns="45720" rIns="91440" bIns="45720" rtlCol="0"/>
+          <a:bodyPr vert="horz" lIns="99048" tIns="49524" rIns="99048" bIns="49524" rtlCol="0"/>
           <a:lstStyle/>
           <a:p>
             <a:pPr lvl="0"/>
@@ -478,18 +478,18 @@
         </p:nvSpPr>
         <p:spPr>
           <a:xfrm>
-            <a:off x="0" y="8685213"/>
-            <a:ext cx="2971800" cy="458787"/>
+            <a:off x="0" y="9721107"/>
+            <a:ext cx="3076363" cy="513507"/>
           </a:xfrm>
           <a:prstGeom prst="rect">
             <a:avLst/>
           </a:prstGeom>
         </p:spPr>
         <p:txBody>
-          <a:bodyPr vert="horz" lIns="91440" tIns="45720" rIns="91440" bIns="45720" rtlCol="0" anchor="b"/>
+          <a:bodyPr vert="horz" lIns="99048" tIns="49524" rIns="99048" bIns="49524" rtlCol="0" anchor="b"/>
           <a:lstStyle>
             <a:lvl1pPr algn="l">
-              <a:defRPr sz="1200"/>
+              <a:defRPr sz="1300"/>
             </a:lvl1pPr>
           </a:lstStyle>
           <a:p>
@@ -509,18 +509,18 @@
         </p:nvSpPr>
         <p:spPr>
           <a:xfrm>
-            <a:off x="3884613" y="8685213"/>
-            <a:ext cx="2971800" cy="458787"/>
+            <a:off x="4021294" y="9721107"/>
+            <a:ext cx="3076363" cy="513507"/>
           </a:xfrm>
           <a:prstGeom prst="rect">
             <a:avLst/>
           </a:prstGeom>
         </p:spPr>
         <p:txBody>
-          <a:bodyPr vert="horz" lIns="91440" tIns="45720" rIns="91440" bIns="45720" rtlCol="0" anchor="b"/>
+          <a:bodyPr vert="horz" lIns="99048" tIns="49524" rIns="99048" bIns="49524" rtlCol="0" anchor="b"/>
           <a:lstStyle>
             <a:lvl1pPr algn="r">
-              <a:defRPr sz="1200"/>
+              <a:defRPr sz="1300"/>
             </a:lvl1pPr>
           </a:lstStyle>
           <a:p>
@@ -826,7 +826,7 @@
           <a:p>
             <a:fld id="{ECAA57DF-1C19-4726-AB84-014692BAD8F5}" type="datetimeFigureOut">
               <a:rPr lang="en-US" smtClean="0"/>
-              <a:t>2/5/2017</a:t>
+              <a:t>2/6/2017</a:t>
             </a:fld>
             <a:endParaRPr lang="en-US"/>
           </a:p>
@@ -3480,7 +3480,7 @@
             <a:fld id="{ECAA57DF-1C19-4726-AB84-014692BAD8F5}" type="datetimeFigureOut">
               <a:rPr lang="en-US" smtClean="0"/>
               <a:pPr/>
-              <a:t>2/5/2017</a:t>
+              <a:t>2/6/2017</a:t>
             </a:fld>
             <a:endParaRPr lang="en-US"/>
           </a:p>
@@ -4081,11 +4081,11 @@
               <a:buNone/>
             </a:pPr>
             <a:r>
-              <a:rPr lang="en-US" sz="2400" b="1" dirty="0"/>
+              <a:rPr lang="en-US" b="1" dirty="0"/>
               <a:t>Metabolism Syndrome</a:t>
             </a:r>
             <a:r>
-              <a:rPr lang="en-US" sz="2400" dirty="0"/>
+              <a:rPr lang="en-US" dirty="0"/>
               <a:t> is a large factor for diabetes mellitus type 2 (DM 2) and Cardiovascular disease (CVD). It is known that the risk of DM 2 can be decreased by coffee consumption. Therefore, the Amsterdam Growth and Health Longitudinal Study (AGAHLS) examined the association between Coffee consumption and the component of Metabolic Syndrome. Prospective data from AGAHLS was used to analyze the association over a period from 27 years to 42 years. </a:t>
             </a:r>
           </a:p>
@@ -4094,7 +4094,7 @@
               <a:buNone/>
             </a:pPr>
             <a:r>
-              <a:rPr lang="en-US" sz="2400" dirty="0"/>
+              <a:rPr lang="en-US" dirty="0"/>
               <a:t>The results showed that moderate and high (&gt;2 cups/day) coffee consumption was significantly associated with lower HDL in women. For Men, coffee consumption was not associated with any of the components of the metabolic syndrome.</a:t>
             </a:r>
           </a:p>
@@ -4144,49 +4144,51 @@
           </a:xfrm>
         </p:spPr>
         <p:txBody>
-          <a:bodyPr/>
+          <a:bodyPr>
+            <a:normAutofit fontScale="92500" lnSpcReduction="20000"/>
+          </a:bodyPr>
           <a:lstStyle/>
           <a:p>
             <a:pPr marL="0" indent="0">
               <a:buNone/>
             </a:pPr>
             <a:r>
-              <a:rPr lang="en-US" sz="2400" b="1" dirty="0"/>
+              <a:rPr lang="en-US" sz="3000" b="1" dirty="0"/>
               <a:t>Cardiovascular Disease (CVD) and diabetes mellitus type 2 (DM 2) are major health problems. Metabolic syndrome (MS) is the large risk factor of these diseases. It consists of five components:</a:t>
             </a:r>
           </a:p>
           <a:p>
             <a:pPr lvl="1"/>
             <a:r>
-              <a:rPr lang="en-US" dirty="0"/>
+              <a:rPr lang="en-US" sz="3000" dirty="0"/>
               <a:t>Elevated Blood Pressure</a:t>
             </a:r>
           </a:p>
           <a:p>
             <a:pPr lvl="1"/>
             <a:r>
-              <a:rPr lang="en-US" dirty="0"/>
+              <a:rPr lang="en-US" sz="3000" dirty="0"/>
               <a:t>Low HDL Cholesterol levels</a:t>
             </a:r>
           </a:p>
           <a:p>
             <a:pPr lvl="1"/>
             <a:r>
-              <a:rPr lang="en-US" dirty="0"/>
+              <a:rPr lang="en-US" sz="3000" dirty="0"/>
               <a:t>High triglycerides levels</a:t>
             </a:r>
           </a:p>
           <a:p>
             <a:pPr lvl="1"/>
             <a:r>
-              <a:rPr lang="en-US" dirty="0"/>
+              <a:rPr lang="en-US" sz="3000" dirty="0"/>
               <a:t>High fasting glucose levels</a:t>
             </a:r>
           </a:p>
           <a:p>
             <a:pPr lvl="1"/>
             <a:r>
-              <a:rPr lang="en-US" dirty="0"/>
+              <a:rPr lang="en-US" sz="3000" dirty="0"/>
               <a:t>Abdominal Obesity</a:t>
             </a:r>
           </a:p>
@@ -4195,7 +4197,7 @@
               <a:buNone/>
             </a:pPr>
             <a:r>
-              <a:rPr lang="en-US" dirty="0"/>
+              <a:rPr lang="en-US" sz="3000" dirty="0"/>
               <a:t>When three of five components are present, metabolic syndrome is diagnosed. </a:t>
             </a:r>
           </a:p>
@@ -4204,7 +4206,7 @@
               <a:buNone/>
             </a:pPr>
             <a:r>
-              <a:rPr lang="en-US" dirty="0"/>
+              <a:rPr lang="en-US" sz="3000" dirty="0"/>
               <a:t>The presence of MS is associated with approximately two-fold elevation in the risk of fatal CVD in men and nonfatal CVD in women. A threefold increase in risk for coronary heart disease and stroke were also reported.</a:t>
             </a:r>
           </a:p>
@@ -4213,7 +4215,7 @@
               <a:buNone/>
             </a:pPr>
             <a:r>
-              <a:rPr lang="en-US" dirty="0"/>
+              <a:rPr lang="en-US" sz="3000" dirty="0"/>
               <a:t>The main causes of Metabolic syndrome (MS) are obesity, genetic factors and lifestyle factors like nutrition, smoking behavior and alcohol consumption. </a:t>
             </a:r>
           </a:p>
@@ -4222,7 +4224,7 @@
               <a:buNone/>
             </a:pPr>
             <a:r>
-              <a:rPr lang="en-US" dirty="0"/>
+              <a:rPr lang="en-US" sz="3000" dirty="0"/>
               <a:t>A common lifestyle aspect, Coffee Consumption is often not studied in relation to the metabolic syndrome. </a:t>
             </a:r>
           </a:p>
@@ -4231,7 +4233,7 @@
               <a:buNone/>
             </a:pPr>
             <a:r>
-              <a:rPr lang="en-US" dirty="0"/>
+              <a:rPr lang="en-US" sz="3000" dirty="0"/>
               <a:t>The effects in previous studies were found inconsistent. But most of these studies focused on short term effects of coffee consumption. </a:t>
             </a:r>
           </a:p>
@@ -4240,7 +4242,7 @@
               <a:buNone/>
             </a:pPr>
             <a:r>
-              <a:rPr lang="en-US" dirty="0"/>
+              <a:rPr lang="en-US" sz="3000" dirty="0"/>
               <a:t>In the present study, long term coffee consumption and MS components were investigated.</a:t>
             </a:r>
           </a:p>
@@ -4293,26 +4295,20 @@
           </a:xfrm>
         </p:spPr>
         <p:txBody>
-          <a:bodyPr/>
+          <a:bodyPr>
+            <a:normAutofit/>
+          </a:bodyPr>
           <a:lstStyle/>
           <a:p>
             <a:r>
               <a:rPr lang="en-US" dirty="0"/>
-              <a:t>Performed observational longitudinal study started in </a:t>
-            </a:r>
-            <a:r>
-              <a:rPr lang="en-US" b="1" dirty="0"/>
-              <a:t>1976 with 450 boys and girls</a:t>
-            </a:r>
-          </a:p>
-          <a:p>
-            <a:r>
-              <a:rPr lang="en-US" dirty="0"/>
-              <a:t>The mean ± SD age of subjects were </a:t>
-            </a:r>
-            <a:r>
-              <a:rPr lang="en-US" b="1" dirty="0"/>
-              <a:t>13.1 ± 0.8</a:t>
+              <a:t>Performed observational longitudinal study started in 1976 with 450 boys and girls</a:t>
+            </a:r>
+          </a:p>
+          <a:p>
+            <a:r>
+              <a:rPr lang="en-US" dirty="0"/>
+              <a:t>The mean ± SD age of subjects were 13.1 ± 0.8</a:t>
             </a:r>
           </a:p>
           <a:p>
@@ -4349,23 +4345,7 @@
           <a:p>
             <a:r>
               <a:rPr lang="en-US" dirty="0"/>
-              <a:t>To examine the association </a:t>
-            </a:r>
-            <a:r>
-              <a:rPr lang="en-US" b="1" dirty="0"/>
-              <a:t>“</a:t>
-            </a:r>
-            <a:r>
-              <a:rPr lang="en-US" b="1"/>
-              <a:t>Two Stages LINEAR </a:t>
-            </a:r>
-            <a:r>
-              <a:rPr lang="en-US" b="1" dirty="0"/>
-              <a:t>REGRESSION” </a:t>
-            </a:r>
-            <a:r>
-              <a:rPr lang="en-US" dirty="0"/>
-              <a:t>analysis was used.</a:t>
+              <a:t>To examine the association “Two Stages LINEAR REGRESSION” analysis was used.</a:t>
             </a:r>
           </a:p>
           <a:p>

</xml_diff>